<commit_message>
module 5 changes made
</commit_message>
<xml_diff>
--- a/Complimentary Course Content/Module5/Lessons/Module5_Lesson2 Spark MLlib and Data Types.pptx
+++ b/Complimentary Course Content/Module5/Lessons/Module5_Lesson2 Spark MLlib and Data Types.pptx
@@ -139,7 +139,7 @@
   </p:defaultTextStyle>
   <p:extLst>
     <p:ext uri="{EFAFB233-063F-42B5-8137-9DF3F51BA10A}">
-      <p15:sldGuideLst xmlns="" xmlns:p15="http://schemas.microsoft.com/office/powerpoint/2012/main">
+      <p15:sldGuideLst xmlns:p15="http://schemas.microsoft.com/office/powerpoint/2012/main" xmlns="">
         <p15:guide id="1" orient="horz" pos="2160">
           <p15:clr>
             <a:srgbClr val="A4A3A4"/>
@@ -245,7 +245,7 @@
             <a:fld id="{49B60EF2-7028-489F-85D8-FE86CD7CF2A0}" type="datetimeFigureOut">
               <a:rPr lang="en-US" smtClean="0"/>
               <a:pPr/>
-              <a:t>6/29/16</a:t>
+              <a:t>7/7/16</a:t>
             </a:fld>
             <a:endParaRPr lang="en-US"/>
           </a:p>
@@ -7121,7 +7121,7 @@
             <a:fld id="{0459C166-16D3-4A25-A2F8-C51E0E346B22}" type="datetimeFigureOut">
               <a:rPr lang="en-US" smtClean="0"/>
               <a:pPr/>
-              <a:t>6/29/16</a:t>
+              <a:t>7/7/16</a:t>
             </a:fld>
             <a:endParaRPr lang="en-US"/>
           </a:p>
@@ -7487,7 +7487,7 @@
             <a:fld id="{0459C166-16D3-4A25-A2F8-C51E0E346B22}" type="datetimeFigureOut">
               <a:rPr lang="en-US" smtClean="0"/>
               <a:pPr/>
-              <a:t>6/29/16</a:t>
+              <a:t>7/7/16</a:t>
             </a:fld>
             <a:endParaRPr lang="en-US"/>
           </a:p>
@@ -7606,7 +7606,7 @@
             <a:fld id="{0459C166-16D3-4A25-A2F8-C51E0E346B22}" type="datetimeFigureOut">
               <a:rPr lang="en-US" smtClean="0"/>
               <a:pPr/>
-              <a:t>6/29/16</a:t>
+              <a:t>7/7/16</a:t>
             </a:fld>
             <a:endParaRPr lang="en-US"/>
           </a:p>
@@ -7703,7 +7703,7 @@
             <a:fld id="{0459C166-16D3-4A25-A2F8-C51E0E346B22}" type="datetimeFigureOut">
               <a:rPr lang="en-US" smtClean="0"/>
               <a:pPr/>
-              <a:t>6/29/16</a:t>
+              <a:t>7/7/16</a:t>
             </a:fld>
             <a:endParaRPr lang="en-US"/>
           </a:p>
@@ -7980,7 +7980,7 @@
             <a:fld id="{0459C166-16D3-4A25-A2F8-C51E0E346B22}" type="datetimeFigureOut">
               <a:rPr lang="en-US" smtClean="0"/>
               <a:pPr/>
-              <a:t>6/29/16</a:t>
+              <a:t>7/7/16</a:t>
             </a:fld>
             <a:endParaRPr lang="en-US"/>
           </a:p>
@@ -8234,7 +8234,7 @@
             <a:fld id="{0459C166-16D3-4A25-A2F8-C51E0E346B22}" type="datetimeFigureOut">
               <a:rPr lang="en-US" smtClean="0"/>
               <a:pPr/>
-              <a:t>6/29/16</a:t>
+              <a:t>7/7/16</a:t>
             </a:fld>
             <a:endParaRPr lang="en-US"/>
           </a:p>
@@ -8404,7 +8404,7 @@
             <a:fld id="{0459C166-16D3-4A25-A2F8-C51E0E346B22}" type="datetimeFigureOut">
               <a:rPr lang="en-US" smtClean="0"/>
               <a:pPr/>
-              <a:t>6/29/16</a:t>
+              <a:t>7/7/16</a:t>
             </a:fld>
             <a:endParaRPr lang="en-US"/>
           </a:p>
@@ -8584,7 +8584,7 @@
             <a:fld id="{0459C166-16D3-4A25-A2F8-C51E0E346B22}" type="datetimeFigureOut">
               <a:rPr lang="en-US" smtClean="0"/>
               <a:pPr/>
-              <a:t>6/29/16</a:t>
+              <a:t>7/7/16</a:t>
             </a:fld>
             <a:endParaRPr lang="en-US"/>
           </a:p>
@@ -8754,7 +8754,7 @@
             <a:fld id="{0459C166-16D3-4A25-A2F8-C51E0E346B22}" type="datetimeFigureOut">
               <a:rPr lang="en-US" smtClean="0"/>
               <a:pPr/>
-              <a:t>6/29/16</a:t>
+              <a:t>7/7/16</a:t>
             </a:fld>
             <a:endParaRPr lang="en-US"/>
           </a:p>
@@ -9019,7 +9019,7 @@
             <a:fld id="{0459C166-16D3-4A25-A2F8-C51E0E346B22}" type="datetimeFigureOut">
               <a:rPr lang="en-US" smtClean="0"/>
               <a:pPr/>
-              <a:t>6/29/16</a:t>
+              <a:t>7/7/16</a:t>
             </a:fld>
             <a:endParaRPr lang="en-US"/>
           </a:p>
@@ -9336,7 +9336,7 @@
             <a:fld id="{0459C166-16D3-4A25-A2F8-C51E0E346B22}" type="datetimeFigureOut">
               <a:rPr lang="en-US" smtClean="0"/>
               <a:pPr/>
-              <a:t>6/29/16</a:t>
+              <a:t>7/7/16</a:t>
             </a:fld>
             <a:endParaRPr lang="en-US"/>
           </a:p>
@@ -9615,7 +9615,7 @@
             <a:fld id="{0459C166-16D3-4A25-A2F8-C51E0E346B22}" type="datetimeFigureOut">
               <a:rPr lang="en-US" smtClean="0"/>
               <a:pPr/>
-              <a:t>6/29/16</a:t>
+              <a:t>7/7/16</a:t>
             </a:fld>
             <a:endParaRPr lang="en-US"/>
           </a:p>
@@ -10604,7 +10604,7 @@
             <a:fld id="{0459C166-16D3-4A25-A2F8-C51E0E346B22}" type="datetimeFigureOut">
               <a:rPr lang="en-US" smtClean="0"/>
               <a:pPr/>
-              <a:t>6/29/16</a:t>
+              <a:t>7/7/16</a:t>
             </a:fld>
             <a:endParaRPr lang="en-US"/>
           </a:p>
@@ -10817,7 +10817,7 @@
             <a:fld id="{0459C166-16D3-4A25-A2F8-C51E0E346B22}" type="datetimeFigureOut">
               <a:rPr lang="en-US" smtClean="0"/>
               <a:pPr/>
-              <a:t>6/29/16</a:t>
+              <a:t>7/7/16</a:t>
             </a:fld>
             <a:endParaRPr lang="en-US"/>
           </a:p>
@@ -24787,7 +24787,7 @@
   <a:extraClrSchemeLst/>
   <a:extLst>
     <a:ext uri="{05A4C25C-085E-4340-85A3-A5531E510DB2}">
-      <thm15:themeFamily xmlns="" xmlns:thm15="http://schemas.microsoft.com/office/thememl/2012/main" name="Office Theme" id="{62F939B6-93AF-4DB8-9C6B-D6C7DFDC589F}" vid="{4A3C46E8-61CC-4603-A589-7422A47A8E4A}"/>
+      <thm15:themeFamily xmlns:thm15="http://schemas.microsoft.com/office/thememl/2012/main" xmlns="" name="Office Theme" id="{62F939B6-93AF-4DB8-9C6B-D6C7DFDC589F}" vid="{4A3C46E8-61CC-4603-A589-7422A47A8E4A}"/>
     </a:ext>
   </a:extLst>
 </a:theme>
@@ -25082,7 +25082,7 @@
   <a:extraClrSchemeLst/>
   <a:extLst>
     <a:ext uri="{05A4C25C-085E-4340-85A3-A5531E510DB2}">
-      <thm15:themeFamily xmlns="" xmlns:thm15="http://schemas.microsoft.com/office/thememl/2012/main" name="Office Theme" id="{62F939B6-93AF-4DB8-9C6B-D6C7DFDC589F}" vid="{4A3C46E8-61CC-4603-A589-7422A47A8E4A}"/>
+      <thm15:themeFamily xmlns:thm15="http://schemas.microsoft.com/office/thememl/2012/main" xmlns="" name="Office Theme" id="{62F939B6-93AF-4DB8-9C6B-D6C7DFDC589F}" vid="{4A3C46E8-61CC-4603-A589-7422A47A8E4A}"/>
     </a:ext>
   </a:extLst>
 </a:theme>

</xml_diff>